<commit_message>
integrated german translation as option
</commit_message>
<xml_diff>
--- a/stimuli/screens.pptx
+++ b/stimuli/screens.pptx
@@ -469,7 +469,7 @@
         <p:nvSpPr>
           <p:cNvPr id="14340" name="Rectangle 4"/>
           <p:cNvSpPr>
-            <a:spLocks noChangeArrowheads="1" noTextEdit="1"/>
+            <a:spLocks noGrp="1" noRot="1" noChangeAspect="1" noChangeArrowheads="1" noTextEdit="1"/>
           </p:cNvSpPr>
           <p:nvPr>
             <p:ph type="sldImg" idx="2"/>
@@ -1226,7 +1226,7 @@
         <p:nvSpPr>
           <p:cNvPr id="18434" name="Rectangle 2"/>
           <p:cNvSpPr>
-            <a:spLocks noChangeArrowheads="1" noTextEdit="1"/>
+            <a:spLocks noGrp="1" noRot="1" noChangeAspect="1" noChangeArrowheads="1" noTextEdit="1"/>
           </p:cNvSpPr>
           <p:nvPr>
             <p:ph type="sldImg"/>
@@ -1467,7 +1467,7 @@
         <p:nvSpPr>
           <p:cNvPr id="16386" name="Rectangle 2"/>
           <p:cNvSpPr>
-            <a:spLocks noChangeArrowheads="1" noTextEdit="1"/>
+            <a:spLocks noGrp="1" noRot="1" noChangeAspect="1" noChangeArrowheads="1" noTextEdit="1"/>
           </p:cNvSpPr>
           <p:nvPr>
             <p:ph type="sldImg"/>
@@ -1949,7 +1949,7 @@
         <p:nvSpPr>
           <p:cNvPr id="18434" name="Rectangle 2"/>
           <p:cNvSpPr>
-            <a:spLocks noChangeArrowheads="1" noTextEdit="1"/>
+            <a:spLocks noGrp="1" noRot="1" noChangeAspect="1" noChangeArrowheads="1" noTextEdit="1"/>
           </p:cNvSpPr>
           <p:nvPr>
             <p:ph type="sldImg"/>
@@ -2190,7 +2190,7 @@
         <p:nvSpPr>
           <p:cNvPr id="16386" name="Rectangle 2"/>
           <p:cNvSpPr>
-            <a:spLocks noChangeArrowheads="1" noTextEdit="1"/>
+            <a:spLocks noGrp="1" noRot="1" noChangeAspect="1" noChangeArrowheads="1" noTextEdit="1"/>
           </p:cNvSpPr>
           <p:nvPr>
             <p:ph type="sldImg"/>
@@ -11209,8 +11209,8 @@
         </p:nvSpPr>
         <p:spPr bwMode="auto">
           <a:xfrm>
-            <a:off x="304800" y="632303"/>
-            <a:ext cx="6553200" cy="1120297"/>
+            <a:off x="304800" y="654200"/>
+            <a:ext cx="6553200" cy="1058741"/>
           </a:xfrm>
           <a:prstGeom prst="rect">
             <a:avLst/>
@@ -11354,7 +11354,7 @@
           <a:p>
             <a:pPr algn="just"/>
             <a:r>
-              <a:rPr lang="en-US" sz="1700" dirty="0" err="1" smtClean="0">
+              <a:rPr lang="en-US" sz="1600" dirty="0" err="1" smtClean="0">
                 <a:solidFill>
                   <a:srgbClr val="FFFFFF"/>
                 </a:solidFill>
@@ -11362,7 +11362,7 @@
               <a:t>Sie</a:t>
             </a:r>
             <a:r>
-              <a:rPr lang="en-US" sz="1700" dirty="0" smtClean="0">
+              <a:rPr lang="en-US" sz="1600" dirty="0" smtClean="0">
                 <a:solidFill>
                   <a:srgbClr val="FFFFFF"/>
                 </a:solidFill>
@@ -11370,7 +11370,7 @@
               <a:t> </a:t>
             </a:r>
             <a:r>
-              <a:rPr lang="en-US" sz="1700" dirty="0" err="1" smtClean="0">
+              <a:rPr lang="en-US" sz="1600" dirty="0" err="1" smtClean="0">
                 <a:solidFill>
                   <a:srgbClr val="FFFFFF"/>
                 </a:solidFill>
@@ -11378,7 +11378,7 @@
               <a:t>werden</a:t>
             </a:r>
             <a:r>
-              <a:rPr lang="en-US" sz="1700" dirty="0" smtClean="0">
+              <a:rPr lang="en-US" sz="1600" dirty="0" smtClean="0">
                 <a:solidFill>
                   <a:srgbClr val="FFFFFF"/>
                 </a:solidFill>
@@ -11386,7 +11386,7 @@
               <a:t> </a:t>
             </a:r>
             <a:r>
-              <a:rPr lang="en-US" sz="1700" dirty="0" err="1" smtClean="0">
+              <a:rPr lang="en-US" sz="1600" dirty="0" err="1" smtClean="0">
                 <a:solidFill>
                   <a:srgbClr val="FFFFFF"/>
                 </a:solidFill>
@@ -11394,7 +11394,7 @@
               <a:t>Ja</a:t>
             </a:r>
             <a:r>
-              <a:rPr lang="en-US" sz="1700" dirty="0" smtClean="0">
+              <a:rPr lang="en-US" sz="1600" dirty="0" smtClean="0">
                 <a:solidFill>
                   <a:srgbClr val="FFFFFF"/>
                 </a:solidFill>
@@ -11402,7 +11402,7 @@
               <a:t>/Nein </a:t>
             </a:r>
             <a:r>
-              <a:rPr lang="en-US" sz="1700" dirty="0" err="1" smtClean="0">
+              <a:rPr lang="en-US" sz="1600" dirty="0" err="1" smtClean="0">
                 <a:solidFill>
                   <a:srgbClr val="FFFFFF"/>
                 </a:solidFill>
@@ -11410,7 +11410,7 @@
               <a:t>Fragen</a:t>
             </a:r>
             <a:r>
-              <a:rPr lang="en-US" sz="1700" dirty="0" smtClean="0">
+              <a:rPr lang="en-US" sz="1600" dirty="0" smtClean="0">
                 <a:solidFill>
                   <a:srgbClr val="FFFFFF"/>
                 </a:solidFill>
@@ -11418,7 +11418,7 @@
               <a:t> </a:t>
             </a:r>
             <a:r>
-              <a:rPr lang="en-US" sz="1700" dirty="0" err="1" smtClean="0">
+              <a:rPr lang="en-US" sz="1600" dirty="0" err="1" smtClean="0">
                 <a:solidFill>
                   <a:srgbClr val="FFFFFF"/>
                 </a:solidFill>
@@ -11426,7 +11426,7 @@
               <a:t>zu</a:t>
             </a:r>
             <a:r>
-              <a:rPr lang="en-US" sz="1700" dirty="0" smtClean="0">
+              <a:rPr lang="en-US" sz="1600" dirty="0" smtClean="0">
                 <a:solidFill>
                   <a:srgbClr val="FFFFFF"/>
                 </a:solidFill>
@@ -11434,7 +11434,7 @@
               <a:t> </a:t>
             </a:r>
             <a:r>
-              <a:rPr lang="en-US" sz="1700" dirty="0" err="1" smtClean="0">
+              <a:rPr lang="en-US" sz="1600" dirty="0" err="1" smtClean="0">
                 <a:solidFill>
                   <a:srgbClr val="FFFFFF"/>
                 </a:solidFill>
@@ -11442,7 +11442,7 @@
               <a:t>verschiedenen</a:t>
             </a:r>
             <a:r>
-              <a:rPr lang="en-US" sz="1700" dirty="0" smtClean="0">
+              <a:rPr lang="en-US" sz="1600" dirty="0" smtClean="0">
                 <a:solidFill>
                   <a:srgbClr val="FFFFFF"/>
                 </a:solidFill>
@@ -11450,7 +11450,7 @@
               <a:t> </a:t>
             </a:r>
             <a:r>
-              <a:rPr lang="en-US" sz="1700" dirty="0" err="1" smtClean="0">
+              <a:rPr lang="en-US" sz="1600" dirty="0" err="1" smtClean="0">
                 <a:solidFill>
                   <a:srgbClr val="FFFFFF"/>
                 </a:solidFill>
@@ -11458,7 +11458,7 @@
               <a:t>Fotos</a:t>
             </a:r>
             <a:r>
-              <a:rPr lang="en-US" sz="1700" dirty="0" smtClean="0">
+              <a:rPr lang="en-US" sz="1600" dirty="0" smtClean="0">
                 <a:solidFill>
                   <a:srgbClr val="FFFFFF"/>
                 </a:solidFill>
@@ -11466,7 +11466,7 @@
               <a:t> </a:t>
             </a:r>
             <a:r>
-              <a:rPr lang="en-US" sz="1700" dirty="0" err="1" smtClean="0">
+              <a:rPr lang="en-US" sz="1600" dirty="0" err="1" smtClean="0">
                 <a:solidFill>
                   <a:srgbClr val="FFFFFF"/>
                 </a:solidFill>
@@ -11474,7 +11474,7 @@
               <a:t>beantworten</a:t>
             </a:r>
             <a:r>
-              <a:rPr lang="en-US" sz="1700" dirty="0" smtClean="0">
+              <a:rPr lang="en-US" sz="1600" dirty="0" smtClean="0">
                 <a:solidFill>
                   <a:srgbClr val="FFFFFF"/>
                 </a:solidFill>
@@ -11482,7 +11482,7 @@
               <a:t>. Die </a:t>
             </a:r>
             <a:r>
-              <a:rPr lang="en-US" sz="1700" dirty="0" err="1" smtClean="0">
+              <a:rPr lang="en-US" sz="1600" dirty="0" err="1" smtClean="0">
                 <a:solidFill>
                   <a:srgbClr val="FFFFFF"/>
                 </a:solidFill>
@@ -11490,7 +11490,7 @@
               <a:t>Fotos</a:t>
             </a:r>
             <a:r>
-              <a:rPr lang="en-US" sz="1700" dirty="0" smtClean="0">
+              <a:rPr lang="en-US" sz="1600" dirty="0" smtClean="0">
                 <a:solidFill>
                   <a:srgbClr val="FFFFFF"/>
                 </a:solidFill>
@@ -11498,7 +11498,7 @@
               <a:t> </a:t>
             </a:r>
             <a:r>
-              <a:rPr lang="en-US" sz="1700" dirty="0" err="1" smtClean="0">
+              <a:rPr lang="en-US" sz="1600" dirty="0" err="1" smtClean="0">
                 <a:solidFill>
                   <a:srgbClr val="FFFFFF"/>
                 </a:solidFill>
@@ -11506,7 +11506,7 @@
               <a:t>werden</a:t>
             </a:r>
             <a:r>
-              <a:rPr lang="en-US" sz="1700" dirty="0" smtClean="0">
+              <a:rPr lang="en-US" sz="1600" dirty="0" smtClean="0">
                 <a:solidFill>
                   <a:srgbClr val="FFFFFF"/>
                 </a:solidFill>
@@ -11514,7 +11514,7 @@
               <a:t> in </a:t>
             </a:r>
             <a:r>
-              <a:rPr lang="en-US" sz="1700" dirty="0" err="1" smtClean="0">
+              <a:rPr lang="en-US" sz="1600" dirty="0" err="1" smtClean="0">
                 <a:solidFill>
                   <a:srgbClr val="FFFFFF"/>
                 </a:solidFill>
@@ -11522,7 +11522,7 @@
               <a:t>Serien</a:t>
             </a:r>
             <a:r>
-              <a:rPr lang="en-US" sz="1700" dirty="0" smtClean="0">
+              <a:rPr lang="en-US" sz="1600" dirty="0" smtClean="0">
                 <a:solidFill>
                   <a:srgbClr val="FFFFFF"/>
                 </a:solidFill>
@@ -11530,7 +11530,7 @@
               <a:t> von 8 </a:t>
             </a:r>
             <a:r>
-              <a:rPr lang="en-US" sz="1700" dirty="0" err="1" smtClean="0">
+              <a:rPr lang="en-US" sz="1600" dirty="0" err="1" smtClean="0">
                 <a:solidFill>
                   <a:srgbClr val="FFFFFF"/>
                 </a:solidFill>
@@ -11538,7 +11538,7 @@
               <a:t>Fotos</a:t>
             </a:r>
             <a:r>
-              <a:rPr lang="en-US" sz="1700" dirty="0" smtClean="0">
+              <a:rPr lang="en-US" sz="1600" dirty="0" smtClean="0">
                 <a:solidFill>
                   <a:srgbClr val="FFFFFF"/>
                 </a:solidFill>
@@ -11546,7 +11546,7 @@
               <a:t> </a:t>
             </a:r>
             <a:r>
-              <a:rPr lang="en-US" sz="1700" dirty="0" err="1" smtClean="0">
+              <a:rPr lang="en-US" sz="1600" dirty="0" err="1" smtClean="0">
                 <a:solidFill>
                   <a:srgbClr val="FFFFFF"/>
                 </a:solidFill>
@@ -11554,7 +11554,7 @@
               <a:t>präsentiert</a:t>
             </a:r>
             <a:r>
-              <a:rPr lang="en-US" sz="1700" dirty="0" smtClean="0">
+              <a:rPr lang="en-US" sz="1600" dirty="0" smtClean="0">
                 <a:solidFill>
                   <a:srgbClr val="FFFFFF"/>
                 </a:solidFill>
@@ -11562,7 +11562,7 @@
               <a:t> und </a:t>
             </a:r>
             <a:r>
-              <a:rPr lang="en-US" sz="1700" dirty="0" err="1" smtClean="0">
+              <a:rPr lang="en-US" sz="1600" dirty="0" err="1" smtClean="0">
                 <a:solidFill>
                   <a:srgbClr val="FFFFFF"/>
                 </a:solidFill>
@@ -11570,7 +11570,7 @@
               <a:t>Sie</a:t>
             </a:r>
             <a:r>
-              <a:rPr lang="en-US" sz="1700" dirty="0" smtClean="0">
+              <a:rPr lang="en-US" sz="1600" dirty="0" smtClean="0">
                 <a:solidFill>
                   <a:srgbClr val="FFFFFF"/>
                 </a:solidFill>
@@ -11578,7 +11578,7 @@
               <a:t> </a:t>
             </a:r>
             <a:r>
-              <a:rPr lang="en-US" sz="1700" dirty="0" err="1" smtClean="0">
+              <a:rPr lang="en-US" sz="1600" dirty="0" err="1" smtClean="0">
                 <a:solidFill>
                   <a:srgbClr val="FFFFFF"/>
                 </a:solidFill>
@@ -11586,7 +11586,7 @@
               <a:t>werden</a:t>
             </a:r>
             <a:r>
-              <a:rPr lang="en-US" sz="1700" dirty="0" smtClean="0">
+              <a:rPr lang="en-US" sz="1600" dirty="0" smtClean="0">
                 <a:solidFill>
                   <a:srgbClr val="FFFFFF"/>
                 </a:solidFill>
@@ -11594,7 +11594,7 @@
               <a:t> </a:t>
             </a:r>
             <a:r>
-              <a:rPr lang="en-US" sz="1700" dirty="0" err="1" smtClean="0">
+              <a:rPr lang="en-US" sz="1600" dirty="0" err="1" smtClean="0">
                 <a:solidFill>
                   <a:srgbClr val="FFFFFF"/>
                 </a:solidFill>
@@ -11602,7 +11602,7 @@
               <a:t>zu</a:t>
             </a:r>
             <a:r>
-              <a:rPr lang="en-US" sz="1700" dirty="0" smtClean="0">
+              <a:rPr lang="en-US" sz="1600" dirty="0" smtClean="0">
                 <a:solidFill>
                   <a:srgbClr val="FFFFFF"/>
                 </a:solidFill>
@@ -11610,7 +11610,7 @@
               <a:t> </a:t>
             </a:r>
             <a:r>
-              <a:rPr lang="en-US" sz="1700" dirty="0" err="1" smtClean="0">
+              <a:rPr lang="en-US" sz="1600" dirty="0" err="1" smtClean="0">
                 <a:solidFill>
                   <a:srgbClr val="FFFFFF"/>
                 </a:solidFill>
@@ -11618,7 +11618,7 @@
               <a:t>allen</a:t>
             </a:r>
             <a:r>
-              <a:rPr lang="en-US" sz="1700" dirty="0" smtClean="0">
+              <a:rPr lang="en-US" sz="1600" dirty="0" smtClean="0">
                 <a:solidFill>
                   <a:srgbClr val="FFFFFF"/>
                 </a:solidFill>
@@ -11626,7 +11626,7 @@
               <a:t> </a:t>
             </a:r>
             <a:r>
-              <a:rPr lang="en-US" sz="1700" dirty="0" err="1" smtClean="0">
+              <a:rPr lang="en-US" sz="1600" dirty="0" err="1" smtClean="0">
                 <a:solidFill>
                   <a:srgbClr val="FFFFFF"/>
                 </a:solidFill>
@@ -11634,7 +11634,7 @@
               <a:t>Fotos</a:t>
             </a:r>
             <a:r>
-              <a:rPr lang="en-US" sz="1700" dirty="0" smtClean="0">
+              <a:rPr lang="en-US" sz="1600" dirty="0" smtClean="0">
                 <a:solidFill>
                   <a:srgbClr val="FFFFFF"/>
                 </a:solidFill>
@@ -11642,7 +11642,7 @@
               <a:t> pro </a:t>
             </a:r>
             <a:r>
-              <a:rPr lang="en-US" sz="1700" dirty="0" err="1" smtClean="0">
+              <a:rPr lang="en-US" sz="1600" dirty="0" err="1" smtClean="0">
                 <a:solidFill>
                   <a:srgbClr val="FFFFFF"/>
                 </a:solidFill>
@@ -11650,7 +11650,7 @@
               <a:t>Serie</a:t>
             </a:r>
             <a:r>
-              <a:rPr lang="en-US" sz="1700" dirty="0" smtClean="0">
+              <a:rPr lang="en-US" sz="1600" dirty="0" smtClean="0">
                 <a:solidFill>
                   <a:srgbClr val="FFFFFF"/>
                 </a:solidFill>
@@ -11658,7 +11658,7 @@
               <a:t> die </a:t>
             </a:r>
             <a:r>
-              <a:rPr lang="en-US" sz="1700" dirty="0" err="1" smtClean="0">
+              <a:rPr lang="en-US" sz="1600" dirty="0" err="1" smtClean="0">
                 <a:solidFill>
                   <a:srgbClr val="FFFFFF"/>
                 </a:solidFill>
@@ -11666,7 +11666,7 @@
               <a:t>gleiche</a:t>
             </a:r>
             <a:r>
-              <a:rPr lang="en-US" sz="1700" dirty="0" smtClean="0">
+              <a:rPr lang="en-US" sz="1600" dirty="0" smtClean="0">
                 <a:solidFill>
                   <a:srgbClr val="FFFFFF"/>
                 </a:solidFill>
@@ -11674,7 +11674,7 @@
               <a:t> </a:t>
             </a:r>
             <a:r>
-              <a:rPr lang="en-US" sz="1700" dirty="0" err="1" smtClean="0">
+              <a:rPr lang="en-US" sz="1600" dirty="0" err="1" smtClean="0">
                 <a:solidFill>
                   <a:srgbClr val="FFFFFF"/>
                 </a:solidFill>
@@ -11682,7 +11682,7 @@
               <a:t>Frage</a:t>
             </a:r>
             <a:r>
-              <a:rPr lang="en-US" sz="1700" dirty="0" smtClean="0">
+              <a:rPr lang="en-US" sz="1600" dirty="0" smtClean="0">
                 <a:solidFill>
                   <a:srgbClr val="FFFFFF"/>
                 </a:solidFill>
@@ -11690,7 +11690,7 @@
               <a:t> </a:t>
             </a:r>
             <a:r>
-              <a:rPr lang="en-US" sz="1700" dirty="0" err="1" smtClean="0">
+              <a:rPr lang="en-US" sz="1600" dirty="0" err="1" smtClean="0">
                 <a:solidFill>
                   <a:srgbClr val="FFFFFF"/>
                 </a:solidFill>
@@ -11698,21 +11698,146 @@
               <a:t>beantworten</a:t>
             </a:r>
             <a:r>
-              <a:rPr lang="en-US" sz="1700" dirty="0" smtClean="0">
-                <a:solidFill>
-                  <a:srgbClr val="FFFFFF"/>
-                </a:solidFill>
-              </a:rPr>
-              <a:t>. The </a:t>
-            </a:r>
-            <a:r>
-              <a:rPr lang="en-US" sz="1700" dirty="0">
-                <a:solidFill>
-                  <a:srgbClr val="FFFFFF"/>
-                </a:solidFill>
-              </a:rPr>
-              <a:t>following shows the first two photos of an example set:</a:t>
-            </a:r>
+              <a:rPr lang="en-US" sz="1600" dirty="0">
+                <a:solidFill>
+                  <a:srgbClr val="FFFFFF"/>
+                </a:solidFill>
+              </a:rPr>
+              <a:t>. Die </a:t>
+            </a:r>
+            <a:r>
+              <a:rPr lang="en-US" sz="1600" dirty="0" err="1">
+                <a:solidFill>
+                  <a:srgbClr val="FFFFFF"/>
+                </a:solidFill>
+              </a:rPr>
+              <a:t>Folgenden</a:t>
+            </a:r>
+            <a:r>
+              <a:rPr lang="en-US" sz="1600" dirty="0">
+                <a:solidFill>
+                  <a:srgbClr val="FFFFFF"/>
+                </a:solidFill>
+              </a:rPr>
+              <a:t> </a:t>
+            </a:r>
+            <a:r>
+              <a:rPr lang="en-US" sz="1600" dirty="0" err="1">
+                <a:solidFill>
+                  <a:srgbClr val="FFFFFF"/>
+                </a:solidFill>
+              </a:rPr>
+              <a:t>Aufnahmen</a:t>
+            </a:r>
+            <a:r>
+              <a:rPr lang="en-US" sz="1600" dirty="0">
+                <a:solidFill>
+                  <a:srgbClr val="FFFFFF"/>
+                </a:solidFill>
+              </a:rPr>
+              <a:t> </a:t>
+            </a:r>
+            <a:r>
+              <a:rPr lang="en-US" sz="1600" dirty="0" err="1">
+                <a:solidFill>
+                  <a:srgbClr val="FFFFFF"/>
+                </a:solidFill>
+              </a:rPr>
+              <a:t>zeigen</a:t>
+            </a:r>
+            <a:r>
+              <a:rPr lang="en-US" sz="1600" dirty="0">
+                <a:solidFill>
+                  <a:srgbClr val="FFFFFF"/>
+                </a:solidFill>
+              </a:rPr>
+              <a:t> die </a:t>
+            </a:r>
+            <a:r>
+              <a:rPr lang="en-US" sz="1600" dirty="0" err="1">
+                <a:solidFill>
+                  <a:srgbClr val="FFFFFF"/>
+                </a:solidFill>
+              </a:rPr>
+              <a:t>ersten</a:t>
+            </a:r>
+            <a:r>
+              <a:rPr lang="en-US" sz="1600" dirty="0">
+                <a:solidFill>
+                  <a:srgbClr val="FFFFFF"/>
+                </a:solidFill>
+              </a:rPr>
+              <a:t> </a:t>
+            </a:r>
+            <a:r>
+              <a:rPr lang="en-US" sz="1600" dirty="0" err="1">
+                <a:solidFill>
+                  <a:srgbClr val="FFFFFF"/>
+                </a:solidFill>
+              </a:rPr>
+              <a:t>beiden</a:t>
+            </a:r>
+            <a:r>
+              <a:rPr lang="en-US" sz="1600" dirty="0">
+                <a:solidFill>
+                  <a:srgbClr val="FFFFFF"/>
+                </a:solidFill>
+              </a:rPr>
+              <a:t> </a:t>
+            </a:r>
+            <a:r>
+              <a:rPr lang="en-US" sz="1600" dirty="0" err="1">
+                <a:solidFill>
+                  <a:srgbClr val="FFFFFF"/>
+                </a:solidFill>
+              </a:rPr>
+              <a:t>Bilder</a:t>
+            </a:r>
+            <a:r>
+              <a:rPr lang="en-US" sz="1600" dirty="0">
+                <a:solidFill>
+                  <a:srgbClr val="FFFFFF"/>
+                </a:solidFill>
+              </a:rPr>
+              <a:t> </a:t>
+            </a:r>
+            <a:r>
+              <a:rPr lang="en-US" sz="1600" dirty="0" err="1">
+                <a:solidFill>
+                  <a:srgbClr val="FFFFFF"/>
+                </a:solidFill>
+              </a:rPr>
+              <a:t>eines</a:t>
+            </a:r>
+            <a:r>
+              <a:rPr lang="en-US" sz="1600" dirty="0">
+                <a:solidFill>
+                  <a:srgbClr val="FFFFFF"/>
+                </a:solidFill>
+              </a:rPr>
+              <a:t> </a:t>
+            </a:r>
+            <a:r>
+              <a:rPr lang="en-US" sz="1600" dirty="0" err="1" smtClean="0">
+                <a:solidFill>
+                  <a:srgbClr val="FFFFFF"/>
+                </a:solidFill>
+              </a:rPr>
+              <a:t>Beispielsets</a:t>
+            </a:r>
+            <a:r>
+              <a:rPr lang="en-US" sz="1600" dirty="0" smtClean="0">
+                <a:solidFill>
+                  <a:srgbClr val="FFFFFF"/>
+                </a:solidFill>
+              </a:rPr>
+              <a:t>:</a:t>
+            </a:r>
+            <a:endParaRPr lang="en-US" sz="1600" dirty="0">
+              <a:solidFill>
+                <a:srgbClr val="FFFFFF"/>
+              </a:solidFill>
+            </a:endParaRPr>
           </a:p>
         </p:txBody>
       </p:sp>
@@ -12039,7 +12164,7 @@
             </a:lvl9pPr>
           </a:lstStyle>
           <a:p>
-            <a:pPr algn="just"/>
+            <a:pPr algn="ctr"/>
             <a:r>
               <a:rPr lang="en-US" sz="1700" dirty="0" err="1" smtClean="0">
                 <a:solidFill>
@@ -12672,8 +12797,16 @@
                   <a:defRPr/>
                 </a:pPr>
                 <a:r>
-                  <a:rPr lang="en-US" sz="1500" dirty="0"/>
-                  <a:t>Is the person</a:t>
+                  <a:rPr lang="en-US" sz="1400" dirty="0" err="1"/>
+                  <a:t>Ist</a:t>
+                </a:r>
+                <a:r>
+                  <a:rPr lang="en-US" sz="1400" dirty="0"/>
+                  <a:t> die </a:t>
+                </a:r>
+                <a:r>
+                  <a:rPr lang="en-US" sz="1400" dirty="0" smtClean="0"/>
+                  <a:t>Person</a:t>
                 </a:r>
               </a:p>
               <a:p>
@@ -12681,9 +12814,14 @@
                   <a:defRPr/>
                 </a:pPr>
                 <a:r>
+                  <a:rPr lang="en-US" sz="1500" b="1" dirty="0" err="1"/>
+                  <a:t>glücklich</a:t>
+                </a:r>
+                <a:r>
                   <a:rPr lang="en-US" sz="1500" b="1" dirty="0"/>
-                  <a:t>happy?</a:t>
+                  <a:t>? </a:t>
                 </a:r>
+                <a:endParaRPr lang="en-US" sz="1500" b="1" dirty="0"/>
               </a:p>
             </p:txBody>
           </p:sp>
@@ -12730,9 +12868,14 @@
                   <a:defRPr/>
                 </a:pPr>
                 <a:r>
+                  <a:rPr lang="en-US" sz="1500" b="1" dirty="0" err="1"/>
+                  <a:t>glücklich</a:t>
+                </a:r>
+                <a:r>
                   <a:rPr lang="en-US" sz="1500" b="1" dirty="0"/>
-                  <a:t>happy?</a:t>
+                  <a:t>? </a:t>
                 </a:r>
+                <a:endParaRPr lang="en-US" sz="1500" b="1" dirty="0"/>
               </a:p>
             </p:txBody>
           </p:sp>
@@ -12895,17 +13038,70 @@
                 <a:defRPr/>
               </a:pPr>
               <a:r>
-                <a:rPr lang="en-US" sz="1100" dirty="0"/>
-                <a:t>Every new set will be preceded by a </a:t>
+                <a:rPr lang="en-US" sz="1000" dirty="0" err="1"/>
+                <a:t>Vor</a:t>
               </a:r>
               <a:r>
-                <a:rPr lang="en-US" sz="1100" b="1" dirty="0"/>
-                <a:t>crosshair</a:t>
+                <a:rPr lang="en-US" sz="1000" dirty="0"/>
+                <a:t> </a:t>
               </a:r>
               <a:r>
-                <a:rPr lang="en-US" sz="1100" dirty="0"/>
-                <a:t> like this one. </a:t>
+                <a:rPr lang="en-US" sz="1000" dirty="0" err="1"/>
+                <a:t>jedem</a:t>
               </a:r>
+              <a:r>
+                <a:rPr lang="en-US" sz="1000" dirty="0"/>
+                <a:t> </a:t>
+              </a:r>
+              <a:r>
+                <a:rPr lang="en-US" sz="1000" dirty="0" err="1"/>
+                <a:t>neuen</a:t>
+              </a:r>
+              <a:r>
+                <a:rPr lang="en-US" sz="1000" dirty="0"/>
+                <a:t> Set </a:t>
+              </a:r>
+              <a:r>
+                <a:rPr lang="en-US" sz="1000" dirty="0" err="1"/>
+                <a:t>erscheint</a:t>
+              </a:r>
+              <a:r>
+                <a:rPr lang="en-US" sz="1000" dirty="0"/>
+                <a:t> </a:t>
+              </a:r>
+              <a:r>
+                <a:rPr lang="en-US" sz="1000" dirty="0" err="1"/>
+                <a:t>ein</a:t>
+              </a:r>
+              <a:r>
+                <a:rPr lang="en-US" sz="1000" dirty="0"/>
+                <a:t> </a:t>
+              </a:r>
+              <a:r>
+                <a:rPr lang="en-US" sz="1000" dirty="0" err="1"/>
+                <a:t>Fadenkreuz</a:t>
+              </a:r>
+              <a:r>
+                <a:rPr lang="en-US" sz="1000" dirty="0"/>
+                <a:t> </a:t>
+              </a:r>
+              <a:r>
+                <a:rPr lang="en-US" sz="1000" dirty="0" err="1"/>
+                <a:t>wie</a:t>
+              </a:r>
+              <a:r>
+                <a:rPr lang="en-US" sz="1000" dirty="0"/>
+                <a:t> dieses </a:t>
+              </a:r>
+              <a:r>
+                <a:rPr lang="en-US" sz="1000" dirty="0" err="1"/>
+                <a:t>hier</a:t>
+              </a:r>
+              <a:r>
+                <a:rPr lang="en-US" sz="1000" dirty="0"/>
+                <a:t>. </a:t>
+              </a:r>
+              <a:endParaRPr lang="en-US" sz="1000" dirty="0"/>
             </a:p>
           </p:txBody>
         </p:sp>
@@ -13017,17 +13213,42 @@
                 <a:defRPr/>
               </a:pPr>
               <a:r>
-                <a:rPr lang="en-US" sz="1100" dirty="0"/>
-                <a:t>Sets will always begin with the </a:t>
+                <a:rPr lang="en-US" sz="1000" dirty="0"/>
+                <a:t>Die Sets </a:t>
               </a:r>
               <a:r>
-                <a:rPr lang="en-US" sz="1100" b="1" dirty="0"/>
-                <a:t>question</a:t>
+                <a:rPr lang="en-US" sz="1000" dirty="0" err="1"/>
+                <a:t>fangen</a:t>
               </a:r>
               <a:r>
-                <a:rPr lang="en-US" sz="1100" dirty="0"/>
-                <a:t>. </a:t>
+                <a:rPr lang="en-US" sz="1000" dirty="0"/>
+                <a:t> </a:t>
               </a:r>
+              <a:r>
+                <a:rPr lang="en-US" sz="1000" dirty="0" err="1"/>
+                <a:t>immer</a:t>
+              </a:r>
+              <a:r>
+                <a:rPr lang="en-US" sz="1000" dirty="0"/>
+                <a:t> </a:t>
+              </a:r>
+              <a:r>
+                <a:rPr lang="en-US" sz="1000" dirty="0" err="1"/>
+                <a:t>mit</a:t>
+              </a:r>
+              <a:r>
+                <a:rPr lang="en-US" sz="1000" dirty="0"/>
+                <a:t> der </a:t>
+              </a:r>
+              <a:r>
+                <a:rPr lang="en-US" sz="1000" dirty="0" err="1"/>
+                <a:t>Frage</a:t>
+              </a:r>
+              <a:r>
+                <a:rPr lang="en-US" sz="1000" dirty="0"/>
+                <a:t> an.</a:t>
+              </a:r>
+              <a:endParaRPr lang="en-US" sz="1000" dirty="0"/>
             </a:p>
           </p:txBody>
         </p:sp>
@@ -13403,18 +13624,54 @@
                 <a:defRPr/>
               </a:pPr>
               <a:r>
-                <a:rPr lang="en-US" sz="1100" dirty="0"/>
-                <a:t>A </a:t>
+                <a:rPr lang="en-US" sz="1000" dirty="0" err="1"/>
+                <a:t>Zwischen</a:t>
               </a:r>
               <a:r>
-                <a:rPr lang="en-US" sz="1100" b="1" dirty="0"/>
-                <a:t>reminder </a:t>
+                <a:rPr lang="en-US" sz="1000" dirty="0"/>
+                <a:t> den Photos in </a:t>
               </a:r>
               <a:r>
-                <a:rPr lang="en-US" sz="1100" dirty="0"/>
-                <a:t>will appear between the photos in each set.</a:t>
+                <a:rPr lang="en-US" sz="1000" dirty="0" err="1"/>
+                <a:t>jedem</a:t>
               </a:r>
-              <a:endParaRPr lang="en-US" sz="1100" b="1" dirty="0"/>
+              <a:r>
+                <a:rPr lang="en-US" sz="1000" dirty="0"/>
+                <a:t> Set </a:t>
+              </a:r>
+              <a:r>
+                <a:rPr lang="en-US" sz="1000" dirty="0" err="1"/>
+                <a:t>wird</a:t>
+              </a:r>
+              <a:r>
+                <a:rPr lang="en-US" sz="1000" dirty="0"/>
+                <a:t> </a:t>
+              </a:r>
+              <a:r>
+                <a:rPr lang="en-US" sz="1000" dirty="0" err="1"/>
+                <a:t>eine</a:t>
+              </a:r>
+              <a:r>
+                <a:rPr lang="en-US" sz="1000" dirty="0"/>
+                <a:t> </a:t>
+              </a:r>
+              <a:r>
+                <a:rPr lang="en-US" sz="1000" dirty="0" err="1"/>
+                <a:t>Erinnerung</a:t>
+              </a:r>
+              <a:r>
+                <a:rPr lang="en-US" sz="1000" dirty="0"/>
+                <a:t> </a:t>
+              </a:r>
+              <a:r>
+                <a:rPr lang="en-US" sz="1000" dirty="0" err="1"/>
+                <a:t>angezeigt</a:t>
+              </a:r>
+              <a:r>
+                <a:rPr lang="en-US" sz="1000" dirty="0"/>
+                <a:t>.</a:t>
+              </a:r>
+              <a:endParaRPr lang="en-US" sz="1000" dirty="0"/>
             </a:p>
           </p:txBody>
         </p:sp>
@@ -13526,9 +13783,54 @@
                 <a:defRPr/>
               </a:pPr>
               <a:r>
-                <a:rPr lang="en-US" sz="1100" dirty="0"/>
-                <a:t>Respond as soon as you have your answer. </a:t>
+                <a:rPr lang="en-US" sz="1000" dirty="0" err="1"/>
+                <a:t>Antworten</a:t>
               </a:r>
+              <a:r>
+                <a:rPr lang="en-US" sz="1000" dirty="0"/>
+                <a:t> </a:t>
+              </a:r>
+              <a:r>
+                <a:rPr lang="en-US" sz="1000" dirty="0" err="1"/>
+                <a:t>Sie</a:t>
+              </a:r>
+              <a:r>
+                <a:rPr lang="en-US" sz="1000" dirty="0"/>
+                <a:t> </a:t>
+              </a:r>
+              <a:r>
+                <a:rPr lang="en-US" sz="1000" dirty="0" err="1"/>
+                <a:t>sobald</a:t>
+              </a:r>
+              <a:r>
+                <a:rPr lang="en-US" sz="1000" dirty="0"/>
+                <a:t> </a:t>
+              </a:r>
+              <a:r>
+                <a:rPr lang="en-US" sz="1000" dirty="0" err="1"/>
+                <a:t>Sie</a:t>
+              </a:r>
+              <a:r>
+                <a:rPr lang="en-US" sz="1000" dirty="0"/>
+                <a:t> die </a:t>
+              </a:r>
+              <a:r>
+                <a:rPr lang="en-US" sz="1000" dirty="0" err="1"/>
+                <a:t>Antwort</a:t>
+              </a:r>
+              <a:r>
+                <a:rPr lang="en-US" sz="1000" dirty="0"/>
+                <a:t> </a:t>
+              </a:r>
+              <a:r>
+                <a:rPr lang="en-US" sz="1000" dirty="0" err="1"/>
+                <a:t>haben</a:t>
+              </a:r>
+              <a:r>
+                <a:rPr lang="en-US" sz="1000" dirty="0"/>
+                <a:t>.</a:t>
+              </a:r>
+              <a:endParaRPr lang="en-US" sz="1000" dirty="0"/>
             </a:p>
           </p:txBody>
         </p:sp>

</xml_diff>